<commit_message>
Quick fixes to report and out-brief format
</commit_message>
<xml_diff>
--- a/report_gen/templates/rva-template.pptx
+++ b/report_gen/templates/rva-template.pptx
@@ -3174,6 +3174,59 @@
           </a:lstStyle>
           <a:p>
             <a:endParaRPr lang="en-US" dirty="0"/>
+          </a:p>
+        </p:txBody>
+      </p:sp>
+      <p:sp>
+        <p:nvSpPr>
+          <p:cNvPr id="2" name="Text Placeholder 4">
+            <a:extLst>
+              <a:ext uri="{FF2B5EF4-FFF2-40B4-BE49-F238E27FC236}">
+                <a16:creationId xmlns:a16="http://schemas.microsoft.com/office/drawing/2014/main" id="{E144BD68-7871-CD9A-111A-4EB5F1676D52}"/>
+              </a:ext>
+            </a:extLst>
+          </p:cNvPr>
+          <p:cNvSpPr>
+            <a:spLocks noGrp="1"/>
+          </p:cNvSpPr>
+          <p:nvPr>
+            <p:ph type="body" sz="quarter" idx="14" hasCustomPrompt="1"/>
+          </p:nvPr>
+        </p:nvSpPr>
+        <p:spPr>
+          <a:xfrm>
+            <a:off x="1217494" y="5373084"/>
+            <a:ext cx="6709010" cy="682682"/>
+          </a:xfrm>
+          <a:prstGeom prst="rect">
+            <a:avLst/>
+          </a:prstGeom>
+        </p:spPr>
+        <p:txBody>
+          <a:bodyPr/>
+          <a:lstStyle>
+            <a:lvl1pPr marL="0" indent="0" algn="ctr">
+              <a:buNone/>
+              <a:defRPr sz="1800">
+                <a:solidFill>
+                  <a:srgbClr val="5A5B5C"/>
+                </a:solidFill>
+              </a:defRPr>
+            </a:lvl1pPr>
+          </a:lstStyle>
+          <a:p>
+            <a:pPr lvl="0"/>
+            <a:r>
+              <a:rPr lang="en-US" dirty="0"/>
+              <a:t>Risk Scores Based on Findings and</a:t>
+            </a:r>
+            <a:br>
+              <a:rPr lang="en-US" dirty="0"/>
+            </a:br>
+            <a:r>
+              <a:rPr lang="en-US" dirty="0"/>
+              <a:t>Number of Findings by Severity</a:t>
+            </a:r>
           </a:p>
         </p:txBody>
       </p:sp>
@@ -7740,41 +7793,6 @@
           <a:chExt cx="0" cy="0"/>
         </a:xfrm>
       </p:grpSpPr>
-      <p:pic>
-        <p:nvPicPr>
-          <p:cNvPr id="3" name="Picture 2">
-            <a:extLst>
-              <a:ext uri="{FF2B5EF4-FFF2-40B4-BE49-F238E27FC236}">
-                <a16:creationId xmlns:a16="http://schemas.microsoft.com/office/drawing/2014/main" id="{9FEAB204-9D6C-B148-A1F6-14A2708F3E87}"/>
-              </a:ext>
-            </a:extLst>
-          </p:cNvPr>
-          <p:cNvPicPr>
-            <a:picLocks noChangeAspect="1"/>
-          </p:cNvPicPr>
-          <p:nvPr userDrawn="1"/>
-        </p:nvPicPr>
-        <p:blipFill>
-          <a:blip r:embed="rId21" cstate="print">
-            <a:extLst>
-              <a:ext uri="{28A0092B-C50C-407E-A947-70E740481C1C}">
-                <a14:useLocalDpi xmlns:a14="http://schemas.microsoft.com/office/drawing/2010/main" val="0"/>
-              </a:ext>
-            </a:extLst>
-          </a:blip>
-          <a:srcRect/>
-          <a:stretch/>
-        </p:blipFill>
-        <p:spPr>
-          <a:xfrm>
-            <a:off x="445930" y="5896740"/>
-            <a:ext cx="685800" cy="682682"/>
-          </a:xfrm>
-          <a:prstGeom prst="rect">
-            <a:avLst/>
-          </a:prstGeom>
-        </p:spPr>
-      </p:pic>
     </p:spTree>
     <p:extLst>
       <p:ext uri="{BB962C8B-B14F-4D97-AF65-F5344CB8AC3E}">

</xml_diff>